<commit_message>
Day 5 Final COde
</commit_message>
<xml_diff>
--- a/Training_Diagrams.pptx
+++ b/Training_Diagrams.pptx
@@ -19,6 +19,8 @@
     <p:sldId id="266" r:id="rId13"/>
     <p:sldId id="267" r:id="rId14"/>
     <p:sldId id="268" r:id="rId15"/>
+    <p:sldId id="270" r:id="rId16"/>
+    <p:sldId id="271" r:id="rId17"/>
   </p:sldIdLst>
   <p:sldSz cx="12192000" cy="6858000"/>
   <p:notesSz cx="6858000" cy="9144000"/>
@@ -363,7 +365,7 @@
           <a:p>
             <a:fld id="{ED291B17-9318-49DB-B28B-6E5994AE9581}" type="datetime1">
               <a:rPr lang="en-US" smtClean="0"/>
-              <a:t>2/15/21</a:t>
+              <a:t>2/17/21</a:t>
             </a:fld>
             <a:endParaRPr lang="en-US" dirty="0"/>
           </a:p>
@@ -566,7 +568,7 @@
           <a:p>
             <a:fld id="{2CED4963-E985-44C4-B8C4-FDD613B7C2F8}" type="datetime1">
               <a:rPr lang="en-US" smtClean="0"/>
-              <a:t>2/15/21</a:t>
+              <a:t>2/17/21</a:t>
             </a:fld>
             <a:endParaRPr lang="en-US" dirty="0"/>
           </a:p>
@@ -928,7 +930,7 @@
           <a:p>
             <a:fld id="{ED291B17-9318-49DB-B28B-6E5994AE9581}" type="datetime1">
               <a:rPr lang="en-US" smtClean="0"/>
-              <a:t>2/15/21</a:t>
+              <a:t>2/17/21</a:t>
             </a:fld>
             <a:endParaRPr lang="en-US" dirty="0"/>
           </a:p>
@@ -1126,7 +1128,7 @@
           <a:p>
             <a:fld id="{78DD82B9-B8EE-4375-B6FF-88FA6ABB15D9}" type="datetime1">
               <a:rPr lang="en-US" smtClean="0"/>
-              <a:t>2/15/21</a:t>
+              <a:t>2/17/21</a:t>
             </a:fld>
             <a:endParaRPr lang="en-US" dirty="0"/>
           </a:p>
@@ -1438,7 +1440,7 @@
           <a:p>
             <a:fld id="{B2497495-0637-405E-AE64-5CC7506D51F5}" type="datetime1">
               <a:rPr lang="en-US" smtClean="0"/>
-              <a:t>2/15/21</a:t>
+              <a:t>2/17/21</a:t>
             </a:fld>
             <a:endParaRPr lang="en-US" dirty="0"/>
           </a:p>
@@ -1691,7 +1693,7 @@
           <a:p>
             <a:fld id="{7BFFD690-9426-415D-8B65-26881E07B2D4}" type="datetime1">
               <a:rPr lang="en-US" smtClean="0"/>
-              <a:t>2/15/21</a:t>
+              <a:t>2/17/21</a:t>
             </a:fld>
             <a:endParaRPr lang="en-US" dirty="0"/>
           </a:p>
@@ -2113,7 +2115,7 @@
           <a:p>
             <a:fld id="{04C4989A-474C-40DE-95B9-011C28B71673}" type="datetime1">
               <a:rPr lang="en-US" smtClean="0"/>
-              <a:t>2/15/21</a:t>
+              <a:t>2/17/21</a:t>
             </a:fld>
             <a:endParaRPr lang="en-US" dirty="0"/>
           </a:p>
@@ -2236,7 +2238,7 @@
           <a:p>
             <a:fld id="{5DB4ED54-5B5E-4A04-93D3-5772E3CE3818}" type="datetime1">
               <a:rPr lang="en-US" smtClean="0"/>
-              <a:t>2/15/21</a:t>
+              <a:t>2/17/21</a:t>
             </a:fld>
             <a:endParaRPr lang="en-US" dirty="0"/>
           </a:p>
@@ -2331,7 +2333,7 @@
           <a:p>
             <a:fld id="{4EDE50D6-574B-40AF-946F-D52A04ADE379}" type="datetime1">
               <a:rPr lang="en-US" smtClean="0"/>
-              <a:t>2/15/21</a:t>
+              <a:t>2/17/21</a:t>
             </a:fld>
             <a:endParaRPr lang="en-US" dirty="0"/>
           </a:p>
@@ -2708,7 +2710,7 @@
           <a:p>
             <a:fld id="{D82884F1-FFEA-405F-9602-3DCA865EDA4E}" type="datetime1">
               <a:rPr lang="en-US" smtClean="0"/>
-              <a:t>2/15/21</a:t>
+              <a:t>2/17/21</a:t>
             </a:fld>
             <a:endParaRPr lang="en-US" dirty="0"/>
           </a:p>
@@ -3001,7 +3003,7 @@
           <a:p>
             <a:fld id="{7E18DB4A-8810-4A10-AD5C-D5E2C667F5B3}" type="datetime1">
               <a:rPr lang="en-US" smtClean="0"/>
-              <a:t>2/15/21</a:t>
+              <a:t>2/17/21</a:t>
             </a:fld>
             <a:endParaRPr lang="en-US" dirty="0"/>
           </a:p>
@@ -3216,7 +3218,7 @@
           <a:p>
             <a:fld id="{ED291B17-9318-49DB-B28B-6E5994AE9581}" type="datetime1">
               <a:rPr lang="en-US" smtClean="0"/>
-              <a:t>2/15/21</a:t>
+              <a:t>2/17/21</a:t>
             </a:fld>
             <a:endParaRPr lang="en-US" dirty="0"/>
           </a:p>
@@ -4142,13 +4144,8 @@
             </a:r>
             <a:r>
               <a:rPr lang="en-US" dirty="0"/>
-              <a:t> </a:t>
-            </a:r>
-            <a:r>
-              <a:rPr lang="en-US"/>
-              <a:t>(jQuery OM)</a:t>
-            </a:r>
-            <a:endParaRPr lang="en-US" dirty="0"/>
+              <a:t> (jQuery OM)</a:t>
+            </a:r>
           </a:p>
         </p:txBody>
       </p:sp>
@@ -4466,6 +4463,84 @@
           </a:p>
         </p:txBody>
       </p:sp>
+      <p:cxnSp>
+        <p:nvCxnSpPr>
+          <p:cNvPr id="15" name="Straight Arrow Connector 14">
+            <a:extLst>
+              <a:ext uri="{FF2B5EF4-FFF2-40B4-BE49-F238E27FC236}">
+                <a16:creationId xmlns:a16="http://schemas.microsoft.com/office/drawing/2014/main" id="{FBB94930-4850-DA42-A81E-B6E4C64CD947}"/>
+              </a:ext>
+            </a:extLst>
+          </p:cNvPr>
+          <p:cNvCxnSpPr/>
+          <p:nvPr/>
+        </p:nvCxnSpPr>
+        <p:spPr>
+          <a:xfrm>
+            <a:off x="1950720" y="2198132"/>
+            <a:ext cx="0" cy="658279"/>
+          </a:xfrm>
+          <a:prstGeom prst="straightConnector1">
+            <a:avLst/>
+          </a:prstGeom>
+          <a:ln>
+            <a:tailEnd type="triangle"/>
+          </a:ln>
+        </p:spPr>
+        <p:style>
+          <a:lnRef idx="1">
+            <a:schemeClr val="accent1"/>
+          </a:lnRef>
+          <a:fillRef idx="0">
+            <a:schemeClr val="accent1"/>
+          </a:fillRef>
+          <a:effectRef idx="0">
+            <a:schemeClr val="accent1"/>
+          </a:effectRef>
+          <a:fontRef idx="minor">
+            <a:schemeClr val="tx1"/>
+          </a:fontRef>
+        </p:style>
+      </p:cxnSp>
+      <p:cxnSp>
+        <p:nvCxnSpPr>
+          <p:cNvPr id="17" name="Straight Arrow Connector 16">
+            <a:extLst>
+              <a:ext uri="{FF2B5EF4-FFF2-40B4-BE49-F238E27FC236}">
+                <a16:creationId xmlns:a16="http://schemas.microsoft.com/office/drawing/2014/main" id="{208CAFC1-3CE0-D642-8831-55334F68DC07}"/>
+              </a:ext>
+            </a:extLst>
+          </p:cNvPr>
+          <p:cNvCxnSpPr/>
+          <p:nvPr/>
+        </p:nvCxnSpPr>
+        <p:spPr>
+          <a:xfrm flipV="1">
+            <a:off x="1454331" y="2119755"/>
+            <a:ext cx="0" cy="736656"/>
+          </a:xfrm>
+          <a:prstGeom prst="straightConnector1">
+            <a:avLst/>
+          </a:prstGeom>
+          <a:ln>
+            <a:tailEnd type="triangle"/>
+          </a:ln>
+        </p:spPr>
+        <p:style>
+          <a:lnRef idx="1">
+            <a:schemeClr val="accent1"/>
+          </a:lnRef>
+          <a:fillRef idx="0">
+            <a:schemeClr val="accent1"/>
+          </a:fillRef>
+          <a:effectRef idx="0">
+            <a:schemeClr val="accent1"/>
+          </a:effectRef>
+          <a:fontRef idx="minor">
+            <a:schemeClr val="tx1"/>
+          </a:fontRef>
+        </p:style>
+      </p:cxnSp>
     </p:spTree>
     <p:extLst>
       <p:ext uri="{BB962C8B-B14F-4D97-AF65-F5344CB8AC3E}">
@@ -6548,6 +6623,2168 @@
     <p:extLst>
       <p:ext uri="{BB962C8B-B14F-4D97-AF65-F5344CB8AC3E}">
         <p14:creationId xmlns:p14="http://schemas.microsoft.com/office/powerpoint/2010/main" val="1744016824"/>
+      </p:ext>
+    </p:extLst>
+  </p:cSld>
+  <p:clrMapOvr>
+    <a:masterClrMapping/>
+  </p:clrMapOvr>
+</p:sld>
+</file>
+
+<file path=ppt/slides/slide15.xml><?xml version="1.0" encoding="utf-8"?>
+<p:sld xmlns:a="http://schemas.openxmlformats.org/drawingml/2006/main" xmlns:r="http://schemas.openxmlformats.org/officeDocument/2006/relationships" xmlns:p="http://schemas.openxmlformats.org/presentationml/2006/main">
+  <p:cSld>
+    <p:spTree>
+      <p:nvGrpSpPr>
+        <p:cNvPr id="1" name=""/>
+        <p:cNvGrpSpPr/>
+        <p:nvPr/>
+      </p:nvGrpSpPr>
+      <p:grpSpPr>
+        <a:xfrm>
+          <a:off x="0" y="0"/>
+          <a:ext cx="0" cy="0"/>
+          <a:chOff x="0" y="0"/>
+          <a:chExt cx="0" cy="0"/>
+        </a:xfrm>
+      </p:grpSpPr>
+      <p:sp>
+        <p:nvSpPr>
+          <p:cNvPr id="2" name="Rectangle 1">
+            <a:extLst>
+              <a:ext uri="{FF2B5EF4-FFF2-40B4-BE49-F238E27FC236}">
+                <a16:creationId xmlns:a16="http://schemas.microsoft.com/office/drawing/2014/main" id="{34854BC3-7F0A-524C-999B-2E5E85039A87}"/>
+              </a:ext>
+            </a:extLst>
+          </p:cNvPr>
+          <p:cNvSpPr/>
+          <p:nvPr/>
+        </p:nvSpPr>
+        <p:spPr>
+          <a:xfrm>
+            <a:off x="6096000" y="931817"/>
+            <a:ext cx="5590903" cy="5808617"/>
+          </a:xfrm>
+          <a:prstGeom prst="rect">
+            <a:avLst/>
+          </a:prstGeom>
+        </p:spPr>
+        <p:style>
+          <a:lnRef idx="2">
+            <a:schemeClr val="accent6"/>
+          </a:lnRef>
+          <a:fillRef idx="1">
+            <a:schemeClr val="lt1"/>
+          </a:fillRef>
+          <a:effectRef idx="0">
+            <a:schemeClr val="accent6"/>
+          </a:effectRef>
+          <a:fontRef idx="minor">
+            <a:schemeClr val="dk1"/>
+          </a:fontRef>
+        </p:style>
+        <p:txBody>
+          <a:bodyPr rtlCol="0" anchor="ctr"/>
+          <a:lstStyle/>
+          <a:p>
+            <a:pPr algn="ctr"/>
+            <a:endParaRPr lang="en-US" dirty="0"/>
+          </a:p>
+        </p:txBody>
+      </p:sp>
+      <p:sp>
+        <p:nvSpPr>
+          <p:cNvPr id="3" name="TextBox 2">
+            <a:extLst>
+              <a:ext uri="{FF2B5EF4-FFF2-40B4-BE49-F238E27FC236}">
+                <a16:creationId xmlns:a16="http://schemas.microsoft.com/office/drawing/2014/main" id="{7F1F6491-8F39-0342-9119-1C7FAABDE931}"/>
+              </a:ext>
+            </a:extLst>
+          </p:cNvPr>
+          <p:cNvSpPr txBox="1"/>
+          <p:nvPr/>
+        </p:nvSpPr>
+        <p:spPr>
+          <a:xfrm>
+            <a:off x="6740434" y="1079863"/>
+            <a:ext cx="4833257" cy="646331"/>
+          </a:xfrm>
+          <a:prstGeom prst="rect">
+            <a:avLst/>
+          </a:prstGeom>
+          <a:noFill/>
+        </p:spPr>
+        <p:txBody>
+          <a:bodyPr wrap="square" rtlCol="0">
+            <a:spAutoFit/>
+          </a:bodyPr>
+          <a:lstStyle/>
+          <a:p>
+            <a:pPr algn="ctr"/>
+            <a:r>
+              <a:rPr lang="en-US" dirty="0"/>
+              <a:t>Server-Side App </a:t>
+            </a:r>
+          </a:p>
+          <a:p>
+            <a:pPr algn="ctr"/>
+            <a:r>
+              <a:rPr lang="en-US" dirty="0"/>
+              <a:t>JSP / ASP.NET/MVC /ASP.NET Core / </a:t>
+            </a:r>
+            <a:r>
+              <a:rPr lang="en-US" dirty="0" err="1"/>
+              <a:t>SpringBoot</a:t>
+            </a:r>
+            <a:endParaRPr lang="en-US" dirty="0"/>
+          </a:p>
+        </p:txBody>
+      </p:sp>
+      <p:sp>
+        <p:nvSpPr>
+          <p:cNvPr id="4" name="Rounded Rectangle 3">
+            <a:extLst>
+              <a:ext uri="{FF2B5EF4-FFF2-40B4-BE49-F238E27FC236}">
+                <a16:creationId xmlns:a16="http://schemas.microsoft.com/office/drawing/2014/main" id="{8458DCC9-F39C-5543-B1BC-D72C076E7A0E}"/>
+              </a:ext>
+            </a:extLst>
+          </p:cNvPr>
+          <p:cNvSpPr/>
+          <p:nvPr/>
+        </p:nvSpPr>
+        <p:spPr>
+          <a:xfrm>
+            <a:off x="7630887" y="2386149"/>
+            <a:ext cx="1079863" cy="3540034"/>
+          </a:xfrm>
+          <a:prstGeom prst="roundRect">
+            <a:avLst/>
+          </a:prstGeom>
+        </p:spPr>
+        <p:style>
+          <a:lnRef idx="2">
+            <a:schemeClr val="accent1">
+              <a:shade val="50000"/>
+            </a:schemeClr>
+          </a:lnRef>
+          <a:fillRef idx="1">
+            <a:schemeClr val="accent1"/>
+          </a:fillRef>
+          <a:effectRef idx="0">
+            <a:schemeClr val="accent1"/>
+          </a:effectRef>
+          <a:fontRef idx="minor">
+            <a:schemeClr val="lt1"/>
+          </a:fontRef>
+        </p:style>
+        <p:txBody>
+          <a:bodyPr rtlCol="0" anchor="ctr"/>
+          <a:lstStyle/>
+          <a:p>
+            <a:pPr algn="ctr"/>
+            <a:r>
+              <a:rPr lang="en-US" dirty="0"/>
+              <a:t>Domain</a:t>
+            </a:r>
+          </a:p>
+          <a:p>
+            <a:pPr algn="ctr"/>
+            <a:r>
+              <a:rPr lang="en-US" dirty="0"/>
+              <a:t>Layer</a:t>
+            </a:r>
+          </a:p>
+        </p:txBody>
+      </p:sp>
+      <p:sp>
+        <p:nvSpPr>
+          <p:cNvPr id="5" name="Rounded Rectangle 4">
+            <a:extLst>
+              <a:ext uri="{FF2B5EF4-FFF2-40B4-BE49-F238E27FC236}">
+                <a16:creationId xmlns:a16="http://schemas.microsoft.com/office/drawing/2014/main" id="{8ADA6EFB-11FE-1440-BD35-0CE2D948FD84}"/>
+              </a:ext>
+            </a:extLst>
+          </p:cNvPr>
+          <p:cNvSpPr/>
+          <p:nvPr/>
+        </p:nvSpPr>
+        <p:spPr>
+          <a:xfrm>
+            <a:off x="8847909" y="2386149"/>
+            <a:ext cx="1402081" cy="3540034"/>
+          </a:xfrm>
+          <a:prstGeom prst="roundRect">
+            <a:avLst/>
+          </a:prstGeom>
+        </p:spPr>
+        <p:style>
+          <a:lnRef idx="2">
+            <a:schemeClr val="accent1">
+              <a:shade val="50000"/>
+            </a:schemeClr>
+          </a:lnRef>
+          <a:fillRef idx="1">
+            <a:schemeClr val="accent1"/>
+          </a:fillRef>
+          <a:effectRef idx="0">
+            <a:schemeClr val="accent1"/>
+          </a:effectRef>
+          <a:fontRef idx="minor">
+            <a:schemeClr val="lt1"/>
+          </a:fontRef>
+        </p:style>
+        <p:txBody>
+          <a:bodyPr rtlCol="0" anchor="ctr"/>
+          <a:lstStyle/>
+          <a:p>
+            <a:pPr algn="ctr"/>
+            <a:r>
+              <a:rPr lang="en-US" dirty="0"/>
+              <a:t>Biz. Workflows</a:t>
+            </a:r>
+          </a:p>
+        </p:txBody>
+      </p:sp>
+      <p:sp>
+        <p:nvSpPr>
+          <p:cNvPr id="6" name="Rounded Rectangle 5">
+            <a:extLst>
+              <a:ext uri="{FF2B5EF4-FFF2-40B4-BE49-F238E27FC236}">
+                <a16:creationId xmlns:a16="http://schemas.microsoft.com/office/drawing/2014/main" id="{61648872-2CBA-244C-9522-C21F29B7EB6B}"/>
+              </a:ext>
+            </a:extLst>
+          </p:cNvPr>
+          <p:cNvSpPr/>
+          <p:nvPr/>
+        </p:nvSpPr>
+        <p:spPr>
+          <a:xfrm>
+            <a:off x="10428514" y="2386149"/>
+            <a:ext cx="1079863" cy="3540034"/>
+          </a:xfrm>
+          <a:prstGeom prst="roundRect">
+            <a:avLst/>
+          </a:prstGeom>
+        </p:spPr>
+        <p:style>
+          <a:lnRef idx="2">
+            <a:schemeClr val="accent1">
+              <a:shade val="50000"/>
+            </a:schemeClr>
+          </a:lnRef>
+          <a:fillRef idx="1">
+            <a:schemeClr val="accent1"/>
+          </a:fillRef>
+          <a:effectRef idx="0">
+            <a:schemeClr val="accent1"/>
+          </a:effectRef>
+          <a:fontRef idx="minor">
+            <a:schemeClr val="lt1"/>
+          </a:fontRef>
+        </p:style>
+        <p:txBody>
+          <a:bodyPr rtlCol="0" anchor="ctr"/>
+          <a:lstStyle/>
+          <a:p>
+            <a:pPr algn="ctr"/>
+            <a:r>
+              <a:rPr lang="en-US" dirty="0"/>
+              <a:t>DAL</a:t>
+            </a:r>
+          </a:p>
+        </p:txBody>
+      </p:sp>
+      <p:sp>
+        <p:nvSpPr>
+          <p:cNvPr id="7" name="Rectangle 6">
+            <a:extLst>
+              <a:ext uri="{FF2B5EF4-FFF2-40B4-BE49-F238E27FC236}">
+                <a16:creationId xmlns:a16="http://schemas.microsoft.com/office/drawing/2014/main" id="{AE5BBF15-A475-C746-8855-A484A4973EC5}"/>
+              </a:ext>
+            </a:extLst>
+          </p:cNvPr>
+          <p:cNvSpPr/>
+          <p:nvPr/>
+        </p:nvSpPr>
+        <p:spPr>
+          <a:xfrm>
+            <a:off x="6217920" y="2211977"/>
+            <a:ext cx="1175657" cy="3988526"/>
+          </a:xfrm>
+          <a:prstGeom prst="rect">
+            <a:avLst/>
+          </a:prstGeom>
+        </p:spPr>
+        <p:style>
+          <a:lnRef idx="2">
+            <a:schemeClr val="accent1">
+              <a:shade val="50000"/>
+            </a:schemeClr>
+          </a:lnRef>
+          <a:fillRef idx="1">
+            <a:schemeClr val="accent1"/>
+          </a:fillRef>
+          <a:effectRef idx="0">
+            <a:schemeClr val="accent1"/>
+          </a:effectRef>
+          <a:fontRef idx="minor">
+            <a:schemeClr val="lt1"/>
+          </a:fontRef>
+        </p:style>
+        <p:txBody>
+          <a:bodyPr rtlCol="0" anchor="ctr"/>
+          <a:lstStyle/>
+          <a:p>
+            <a:pPr algn="ctr"/>
+            <a:r>
+              <a:rPr lang="en-US" dirty="0"/>
+              <a:t>Public</a:t>
+            </a:r>
+          </a:p>
+          <a:p>
+            <a:pPr algn="ctr"/>
+            <a:r>
+              <a:rPr lang="en-US" dirty="0"/>
+              <a:t>REST</a:t>
+            </a:r>
+          </a:p>
+          <a:p>
+            <a:pPr algn="ctr"/>
+            <a:r>
+              <a:rPr lang="en-US" dirty="0"/>
+              <a:t>End-</a:t>
+            </a:r>
+          </a:p>
+          <a:p>
+            <a:pPr algn="ctr"/>
+            <a:r>
+              <a:rPr lang="en-US" dirty="0"/>
+              <a:t>Points</a:t>
+            </a:r>
+          </a:p>
+          <a:p>
+            <a:pPr algn="ctr"/>
+            <a:r>
+              <a:rPr lang="en-US" dirty="0"/>
+              <a:t>Register for Guest /</a:t>
+            </a:r>
+          </a:p>
+          <a:p>
+            <a:pPr algn="ctr"/>
+            <a:r>
+              <a:rPr lang="en-US" dirty="0"/>
+              <a:t>Set Access based on Role</a:t>
+            </a:r>
+          </a:p>
+        </p:txBody>
+      </p:sp>
+      <p:sp>
+        <p:nvSpPr>
+          <p:cNvPr id="8" name="Rectangle 7">
+            <a:extLst>
+              <a:ext uri="{FF2B5EF4-FFF2-40B4-BE49-F238E27FC236}">
+                <a16:creationId xmlns:a16="http://schemas.microsoft.com/office/drawing/2014/main" id="{298E543A-F1F6-184B-9994-1EBFF98CA6DD}"/>
+              </a:ext>
+            </a:extLst>
+          </p:cNvPr>
+          <p:cNvSpPr/>
+          <p:nvPr/>
+        </p:nvSpPr>
+        <p:spPr>
+          <a:xfrm>
+            <a:off x="213359" y="2109369"/>
+            <a:ext cx="3422469" cy="4387223"/>
+          </a:xfrm>
+          <a:prstGeom prst="rect">
+            <a:avLst/>
+          </a:prstGeom>
+        </p:spPr>
+        <p:style>
+          <a:lnRef idx="2">
+            <a:schemeClr val="accent1">
+              <a:shade val="50000"/>
+            </a:schemeClr>
+          </a:lnRef>
+          <a:fillRef idx="1">
+            <a:schemeClr val="accent1"/>
+          </a:fillRef>
+          <a:effectRef idx="0">
+            <a:schemeClr val="accent1"/>
+          </a:effectRef>
+          <a:fontRef idx="minor">
+            <a:schemeClr val="lt1"/>
+          </a:fontRef>
+        </p:style>
+        <p:txBody>
+          <a:bodyPr rtlCol="0" anchor="ctr"/>
+          <a:lstStyle/>
+          <a:p>
+            <a:pPr algn="ctr"/>
+            <a:r>
+              <a:rPr lang="en-US" dirty="0"/>
+              <a:t>Angular Client as SPA</a:t>
+            </a:r>
+          </a:p>
+          <a:p>
+            <a:pPr algn="ctr"/>
+            <a:endParaRPr lang="en-US" dirty="0"/>
+          </a:p>
+          <a:p>
+            <a:pPr algn="ctr"/>
+            <a:endParaRPr lang="en-US" dirty="0"/>
+          </a:p>
+          <a:p>
+            <a:pPr algn="ctr"/>
+            <a:endParaRPr lang="en-US" dirty="0"/>
+          </a:p>
+          <a:p>
+            <a:pPr algn="ctr"/>
+            <a:endParaRPr lang="en-US" dirty="0"/>
+          </a:p>
+          <a:p>
+            <a:pPr algn="ctr"/>
+            <a:endParaRPr lang="en-US" dirty="0"/>
+          </a:p>
+          <a:p>
+            <a:pPr algn="ctr"/>
+            <a:endParaRPr lang="en-US" dirty="0"/>
+          </a:p>
+          <a:p>
+            <a:pPr algn="ctr"/>
+            <a:endParaRPr lang="en-US" dirty="0"/>
+          </a:p>
+          <a:p>
+            <a:pPr algn="ctr"/>
+            <a:endParaRPr lang="en-US" dirty="0"/>
+          </a:p>
+          <a:p>
+            <a:pPr algn="ctr"/>
+            <a:endParaRPr lang="en-US" dirty="0"/>
+          </a:p>
+          <a:p>
+            <a:pPr algn="ctr"/>
+            <a:endParaRPr lang="en-US" dirty="0"/>
+          </a:p>
+          <a:p>
+            <a:pPr algn="ctr"/>
+            <a:endParaRPr lang="en-US" dirty="0"/>
+          </a:p>
+        </p:txBody>
+      </p:sp>
+      <p:sp>
+        <p:nvSpPr>
+          <p:cNvPr id="9" name="Can 8">
+            <a:extLst>
+              <a:ext uri="{FF2B5EF4-FFF2-40B4-BE49-F238E27FC236}">
+                <a16:creationId xmlns:a16="http://schemas.microsoft.com/office/drawing/2014/main" id="{ACD7F658-937E-5C4F-8527-11FCBD17BAD4}"/>
+              </a:ext>
+            </a:extLst>
+          </p:cNvPr>
+          <p:cNvSpPr/>
+          <p:nvPr/>
+        </p:nvSpPr>
+        <p:spPr>
+          <a:xfrm rot="16200000">
+            <a:off x="4872446" y="3340685"/>
+            <a:ext cx="766354" cy="1924594"/>
+          </a:xfrm>
+          <a:prstGeom prst="can">
+            <a:avLst/>
+          </a:prstGeom>
+        </p:spPr>
+        <p:style>
+          <a:lnRef idx="2">
+            <a:schemeClr val="accent1">
+              <a:shade val="50000"/>
+            </a:schemeClr>
+          </a:lnRef>
+          <a:fillRef idx="1">
+            <a:schemeClr val="accent1"/>
+          </a:fillRef>
+          <a:effectRef idx="0">
+            <a:schemeClr val="accent1"/>
+          </a:effectRef>
+          <a:fontRef idx="minor">
+            <a:schemeClr val="lt1"/>
+          </a:fontRef>
+        </p:style>
+        <p:txBody>
+          <a:bodyPr rtlCol="0" anchor="ctr"/>
+          <a:lstStyle/>
+          <a:p>
+            <a:pPr algn="ctr"/>
+            <a:endParaRPr lang="en-US"/>
+          </a:p>
+        </p:txBody>
+      </p:sp>
+      <p:sp>
+        <p:nvSpPr>
+          <p:cNvPr id="10" name="TextBox 9">
+            <a:extLst>
+              <a:ext uri="{FF2B5EF4-FFF2-40B4-BE49-F238E27FC236}">
+                <a16:creationId xmlns:a16="http://schemas.microsoft.com/office/drawing/2014/main" id="{22CD3C94-475C-A644-9A09-9DFB6D6D2B15}"/>
+              </a:ext>
+            </a:extLst>
+          </p:cNvPr>
+          <p:cNvSpPr txBox="1"/>
+          <p:nvPr/>
+        </p:nvSpPr>
+        <p:spPr>
+          <a:xfrm>
+            <a:off x="4615543" y="4014651"/>
+            <a:ext cx="1358538" cy="646331"/>
+          </a:xfrm>
+          <a:prstGeom prst="rect">
+            <a:avLst/>
+          </a:prstGeom>
+          <a:noFill/>
+        </p:spPr>
+        <p:txBody>
+          <a:bodyPr wrap="square" rtlCol="0">
+            <a:spAutoFit/>
+          </a:bodyPr>
+          <a:lstStyle/>
+          <a:p>
+            <a:r>
+              <a:rPr lang="en-US" dirty="0"/>
+              <a:t>HTTP Channel</a:t>
+            </a:r>
+          </a:p>
+        </p:txBody>
+      </p:sp>
+      <p:sp>
+        <p:nvSpPr>
+          <p:cNvPr id="11" name="Right Arrow 10">
+            <a:extLst>
+              <a:ext uri="{FF2B5EF4-FFF2-40B4-BE49-F238E27FC236}">
+                <a16:creationId xmlns:a16="http://schemas.microsoft.com/office/drawing/2014/main" id="{1AF52D5D-DC27-0E4A-ABCD-C75333BA96E3}"/>
+              </a:ext>
+            </a:extLst>
+          </p:cNvPr>
+          <p:cNvSpPr/>
+          <p:nvPr/>
+        </p:nvSpPr>
+        <p:spPr>
+          <a:xfrm>
+            <a:off x="3744686" y="4156166"/>
+            <a:ext cx="571500" cy="181650"/>
+          </a:xfrm>
+          <a:prstGeom prst="rightArrow">
+            <a:avLst/>
+          </a:prstGeom>
+          <a:solidFill>
+            <a:srgbClr val="FF0000"/>
+          </a:solidFill>
+        </p:spPr>
+        <p:style>
+          <a:lnRef idx="2">
+            <a:schemeClr val="accent1">
+              <a:shade val="50000"/>
+            </a:schemeClr>
+          </a:lnRef>
+          <a:fillRef idx="1">
+            <a:schemeClr val="accent1"/>
+          </a:fillRef>
+          <a:effectRef idx="0">
+            <a:schemeClr val="accent1"/>
+          </a:effectRef>
+          <a:fontRef idx="minor">
+            <a:schemeClr val="lt1"/>
+          </a:fontRef>
+        </p:style>
+        <p:txBody>
+          <a:bodyPr rtlCol="0" anchor="ctr"/>
+          <a:lstStyle/>
+          <a:p>
+            <a:pPr algn="ctr"/>
+            <a:endParaRPr lang="en-US"/>
+          </a:p>
+        </p:txBody>
+      </p:sp>
+      <p:sp>
+        <p:nvSpPr>
+          <p:cNvPr id="12" name="Left Arrow 11">
+            <a:extLst>
+              <a:ext uri="{FF2B5EF4-FFF2-40B4-BE49-F238E27FC236}">
+                <a16:creationId xmlns:a16="http://schemas.microsoft.com/office/drawing/2014/main" id="{B0EB32BE-AC92-4349-BB5C-20AD9B54CC31}"/>
+              </a:ext>
+            </a:extLst>
+          </p:cNvPr>
+          <p:cNvSpPr/>
+          <p:nvPr/>
+        </p:nvSpPr>
+        <p:spPr>
+          <a:xfrm>
+            <a:off x="3772987" y="4423954"/>
+            <a:ext cx="605246" cy="181650"/>
+          </a:xfrm>
+          <a:prstGeom prst="leftArrow">
+            <a:avLst/>
+          </a:prstGeom>
+          <a:solidFill>
+            <a:srgbClr val="FF0000"/>
+          </a:solidFill>
+        </p:spPr>
+        <p:style>
+          <a:lnRef idx="2">
+            <a:schemeClr val="accent1">
+              <a:shade val="50000"/>
+            </a:schemeClr>
+          </a:lnRef>
+          <a:fillRef idx="1">
+            <a:schemeClr val="accent1"/>
+          </a:fillRef>
+          <a:effectRef idx="0">
+            <a:schemeClr val="accent1"/>
+          </a:effectRef>
+          <a:fontRef idx="minor">
+            <a:schemeClr val="lt1"/>
+          </a:fontRef>
+        </p:style>
+        <p:txBody>
+          <a:bodyPr rtlCol="0" anchor="ctr"/>
+          <a:lstStyle/>
+          <a:p>
+            <a:pPr algn="ctr"/>
+            <a:endParaRPr lang="en-US"/>
+          </a:p>
+        </p:txBody>
+      </p:sp>
+      <p:sp>
+        <p:nvSpPr>
+          <p:cNvPr id="13" name="Right Arrow 12">
+            <a:extLst>
+              <a:ext uri="{FF2B5EF4-FFF2-40B4-BE49-F238E27FC236}">
+                <a16:creationId xmlns:a16="http://schemas.microsoft.com/office/drawing/2014/main" id="{5E436C2A-CBDD-E542-BDE5-6EFB4D764E0D}"/>
+              </a:ext>
+            </a:extLst>
+          </p:cNvPr>
+          <p:cNvSpPr/>
+          <p:nvPr/>
+        </p:nvSpPr>
+        <p:spPr>
+          <a:xfrm>
+            <a:off x="7289074" y="2969623"/>
+            <a:ext cx="452846" cy="235131"/>
+          </a:xfrm>
+          <a:prstGeom prst="rightArrow">
+            <a:avLst/>
+          </a:prstGeom>
+          <a:solidFill>
+            <a:srgbClr val="FF0000"/>
+          </a:solidFill>
+        </p:spPr>
+        <p:style>
+          <a:lnRef idx="2">
+            <a:schemeClr val="accent1">
+              <a:shade val="50000"/>
+            </a:schemeClr>
+          </a:lnRef>
+          <a:fillRef idx="1">
+            <a:schemeClr val="accent1"/>
+          </a:fillRef>
+          <a:effectRef idx="0">
+            <a:schemeClr val="accent1"/>
+          </a:effectRef>
+          <a:fontRef idx="minor">
+            <a:schemeClr val="lt1"/>
+          </a:fontRef>
+        </p:style>
+        <p:txBody>
+          <a:bodyPr rtlCol="0" anchor="ctr"/>
+          <a:lstStyle/>
+          <a:p>
+            <a:pPr algn="ctr"/>
+            <a:endParaRPr lang="en-US"/>
+          </a:p>
+        </p:txBody>
+      </p:sp>
+      <p:sp>
+        <p:nvSpPr>
+          <p:cNvPr id="14" name="Right Arrow 13">
+            <a:extLst>
+              <a:ext uri="{FF2B5EF4-FFF2-40B4-BE49-F238E27FC236}">
+                <a16:creationId xmlns:a16="http://schemas.microsoft.com/office/drawing/2014/main" id="{1D3017A4-90C3-B04E-807C-1572011717F4}"/>
+              </a:ext>
+            </a:extLst>
+          </p:cNvPr>
+          <p:cNvSpPr/>
+          <p:nvPr/>
+        </p:nvSpPr>
+        <p:spPr>
+          <a:xfrm>
+            <a:off x="8519159" y="3087188"/>
+            <a:ext cx="452846" cy="235131"/>
+          </a:xfrm>
+          <a:prstGeom prst="rightArrow">
+            <a:avLst/>
+          </a:prstGeom>
+          <a:solidFill>
+            <a:srgbClr val="FF0000"/>
+          </a:solidFill>
+        </p:spPr>
+        <p:style>
+          <a:lnRef idx="2">
+            <a:schemeClr val="accent1">
+              <a:shade val="50000"/>
+            </a:schemeClr>
+          </a:lnRef>
+          <a:fillRef idx="1">
+            <a:schemeClr val="accent1"/>
+          </a:fillRef>
+          <a:effectRef idx="0">
+            <a:schemeClr val="accent1"/>
+          </a:effectRef>
+          <a:fontRef idx="minor">
+            <a:schemeClr val="lt1"/>
+          </a:fontRef>
+        </p:style>
+        <p:txBody>
+          <a:bodyPr rtlCol="0" anchor="ctr"/>
+          <a:lstStyle/>
+          <a:p>
+            <a:pPr algn="ctr"/>
+            <a:endParaRPr lang="en-US"/>
+          </a:p>
+        </p:txBody>
+      </p:sp>
+      <p:sp>
+        <p:nvSpPr>
+          <p:cNvPr id="15" name="Right Arrow 14">
+            <a:extLst>
+              <a:ext uri="{FF2B5EF4-FFF2-40B4-BE49-F238E27FC236}">
+                <a16:creationId xmlns:a16="http://schemas.microsoft.com/office/drawing/2014/main" id="{41A47096-81CB-9D40-AC88-E5EBFA4AFFD1}"/>
+              </a:ext>
+            </a:extLst>
+          </p:cNvPr>
+          <p:cNvSpPr/>
+          <p:nvPr/>
+        </p:nvSpPr>
+        <p:spPr>
+          <a:xfrm>
+            <a:off x="10112829" y="3204753"/>
+            <a:ext cx="452846" cy="235131"/>
+          </a:xfrm>
+          <a:prstGeom prst="rightArrow">
+            <a:avLst/>
+          </a:prstGeom>
+          <a:solidFill>
+            <a:srgbClr val="FF0000"/>
+          </a:solidFill>
+        </p:spPr>
+        <p:style>
+          <a:lnRef idx="2">
+            <a:schemeClr val="accent1">
+              <a:shade val="50000"/>
+            </a:schemeClr>
+          </a:lnRef>
+          <a:fillRef idx="1">
+            <a:schemeClr val="accent1"/>
+          </a:fillRef>
+          <a:effectRef idx="0">
+            <a:schemeClr val="accent1"/>
+          </a:effectRef>
+          <a:fontRef idx="minor">
+            <a:schemeClr val="lt1"/>
+          </a:fontRef>
+        </p:style>
+        <p:txBody>
+          <a:bodyPr rtlCol="0" anchor="ctr"/>
+          <a:lstStyle/>
+          <a:p>
+            <a:pPr algn="ctr"/>
+            <a:endParaRPr lang="en-US"/>
+          </a:p>
+        </p:txBody>
+      </p:sp>
+      <p:sp>
+        <p:nvSpPr>
+          <p:cNvPr id="16" name="Right Arrow 15">
+            <a:extLst>
+              <a:ext uri="{FF2B5EF4-FFF2-40B4-BE49-F238E27FC236}">
+                <a16:creationId xmlns:a16="http://schemas.microsoft.com/office/drawing/2014/main" id="{09442C16-66DB-0D47-9A8C-F96017FF7C93}"/>
+              </a:ext>
+            </a:extLst>
+          </p:cNvPr>
+          <p:cNvSpPr/>
+          <p:nvPr/>
+        </p:nvSpPr>
+        <p:spPr>
+          <a:xfrm rot="10800000">
+            <a:off x="10047516" y="4425851"/>
+            <a:ext cx="452846" cy="235131"/>
+          </a:xfrm>
+          <a:prstGeom prst="rightArrow">
+            <a:avLst/>
+          </a:prstGeom>
+          <a:solidFill>
+            <a:srgbClr val="FF0000"/>
+          </a:solidFill>
+        </p:spPr>
+        <p:style>
+          <a:lnRef idx="2">
+            <a:schemeClr val="accent1">
+              <a:shade val="50000"/>
+            </a:schemeClr>
+          </a:lnRef>
+          <a:fillRef idx="1">
+            <a:schemeClr val="accent1"/>
+          </a:fillRef>
+          <a:effectRef idx="0">
+            <a:schemeClr val="accent1"/>
+          </a:effectRef>
+          <a:fontRef idx="minor">
+            <a:schemeClr val="lt1"/>
+          </a:fontRef>
+        </p:style>
+        <p:txBody>
+          <a:bodyPr rtlCol="0" anchor="ctr"/>
+          <a:lstStyle/>
+          <a:p>
+            <a:pPr algn="ctr"/>
+            <a:endParaRPr lang="en-US"/>
+          </a:p>
+        </p:txBody>
+      </p:sp>
+      <p:sp>
+        <p:nvSpPr>
+          <p:cNvPr id="17" name="Right Arrow 16">
+            <a:extLst>
+              <a:ext uri="{FF2B5EF4-FFF2-40B4-BE49-F238E27FC236}">
+                <a16:creationId xmlns:a16="http://schemas.microsoft.com/office/drawing/2014/main" id="{2DEB09DE-8D79-BE47-BE66-3F5EC39FB87C}"/>
+              </a:ext>
+            </a:extLst>
+          </p:cNvPr>
+          <p:cNvSpPr/>
+          <p:nvPr/>
+        </p:nvSpPr>
+        <p:spPr>
+          <a:xfrm rot="10800000">
+            <a:off x="8519159" y="4796245"/>
+            <a:ext cx="452846" cy="235131"/>
+          </a:xfrm>
+          <a:prstGeom prst="rightArrow">
+            <a:avLst/>
+          </a:prstGeom>
+          <a:solidFill>
+            <a:srgbClr val="FF0000"/>
+          </a:solidFill>
+        </p:spPr>
+        <p:style>
+          <a:lnRef idx="2">
+            <a:schemeClr val="accent1">
+              <a:shade val="50000"/>
+            </a:schemeClr>
+          </a:lnRef>
+          <a:fillRef idx="1">
+            <a:schemeClr val="accent1"/>
+          </a:fillRef>
+          <a:effectRef idx="0">
+            <a:schemeClr val="accent1"/>
+          </a:effectRef>
+          <a:fontRef idx="minor">
+            <a:schemeClr val="lt1"/>
+          </a:fontRef>
+        </p:style>
+        <p:txBody>
+          <a:bodyPr rtlCol="0" anchor="ctr"/>
+          <a:lstStyle/>
+          <a:p>
+            <a:pPr algn="ctr"/>
+            <a:endParaRPr lang="en-US"/>
+          </a:p>
+        </p:txBody>
+      </p:sp>
+      <p:sp>
+        <p:nvSpPr>
+          <p:cNvPr id="18" name="Right Arrow 17">
+            <a:extLst>
+              <a:ext uri="{FF2B5EF4-FFF2-40B4-BE49-F238E27FC236}">
+                <a16:creationId xmlns:a16="http://schemas.microsoft.com/office/drawing/2014/main" id="{210D1A6D-DFDF-8B49-AF26-0F7762C1BCEF}"/>
+              </a:ext>
+            </a:extLst>
+          </p:cNvPr>
+          <p:cNvSpPr/>
+          <p:nvPr/>
+        </p:nvSpPr>
+        <p:spPr>
+          <a:xfrm rot="10800000">
+            <a:off x="7269479" y="5031377"/>
+            <a:ext cx="452846" cy="235131"/>
+          </a:xfrm>
+          <a:prstGeom prst="rightArrow">
+            <a:avLst/>
+          </a:prstGeom>
+          <a:solidFill>
+            <a:srgbClr val="FF0000"/>
+          </a:solidFill>
+        </p:spPr>
+        <p:style>
+          <a:lnRef idx="2">
+            <a:schemeClr val="accent1">
+              <a:shade val="50000"/>
+            </a:schemeClr>
+          </a:lnRef>
+          <a:fillRef idx="1">
+            <a:schemeClr val="accent1"/>
+          </a:fillRef>
+          <a:effectRef idx="0">
+            <a:schemeClr val="accent1"/>
+          </a:effectRef>
+          <a:fontRef idx="minor">
+            <a:schemeClr val="lt1"/>
+          </a:fontRef>
+        </p:style>
+        <p:txBody>
+          <a:bodyPr rtlCol="0" anchor="ctr"/>
+          <a:lstStyle/>
+          <a:p>
+            <a:pPr algn="ctr"/>
+            <a:endParaRPr lang="en-US"/>
+          </a:p>
+        </p:txBody>
+      </p:sp>
+      <p:sp>
+        <p:nvSpPr>
+          <p:cNvPr id="19" name="TextBox 18">
+            <a:extLst>
+              <a:ext uri="{FF2B5EF4-FFF2-40B4-BE49-F238E27FC236}">
+                <a16:creationId xmlns:a16="http://schemas.microsoft.com/office/drawing/2014/main" id="{7DC8BB75-F088-8F42-8358-E0F0D1C35D0F}"/>
+              </a:ext>
+            </a:extLst>
+          </p:cNvPr>
+          <p:cNvSpPr txBox="1"/>
+          <p:nvPr/>
+        </p:nvSpPr>
+        <p:spPr>
+          <a:xfrm>
+            <a:off x="383177" y="5266509"/>
+            <a:ext cx="3013166" cy="646331"/>
+          </a:xfrm>
+          <a:prstGeom prst="rect">
+            <a:avLst/>
+          </a:prstGeom>
+          <a:noFill/>
+        </p:spPr>
+        <p:txBody>
+          <a:bodyPr wrap="square" rtlCol="0">
+            <a:spAutoFit/>
+          </a:bodyPr>
+          <a:lstStyle/>
+          <a:p>
+            <a:r>
+              <a:rPr lang="en-US" dirty="0" err="1"/>
+              <a:t>Runtime.js</a:t>
+            </a:r>
+            <a:r>
+              <a:rPr lang="en-US" dirty="0"/>
+              <a:t> / </a:t>
+            </a:r>
+            <a:r>
+              <a:rPr lang="en-US" dirty="0" err="1"/>
+              <a:t>polyfills.js</a:t>
+            </a:r>
+            <a:r>
+              <a:rPr lang="en-US" dirty="0"/>
+              <a:t> / </a:t>
+            </a:r>
+            <a:r>
+              <a:rPr lang="en-US" dirty="0" err="1"/>
+              <a:t>Styles.css</a:t>
+            </a:r>
+            <a:r>
+              <a:rPr lang="en-US" dirty="0"/>
+              <a:t> / </a:t>
+            </a:r>
+            <a:r>
+              <a:rPr lang="en-US" dirty="0" err="1"/>
+              <a:t>main.js</a:t>
+            </a:r>
+            <a:endParaRPr lang="en-US" dirty="0"/>
+          </a:p>
+        </p:txBody>
+      </p:sp>
+      <p:sp>
+        <p:nvSpPr>
+          <p:cNvPr id="20" name="Rectangle 19">
+            <a:extLst>
+              <a:ext uri="{FF2B5EF4-FFF2-40B4-BE49-F238E27FC236}">
+                <a16:creationId xmlns:a16="http://schemas.microsoft.com/office/drawing/2014/main" id="{9E17731F-C316-114F-A9F6-04BAFFD2106E}"/>
+              </a:ext>
+            </a:extLst>
+          </p:cNvPr>
+          <p:cNvSpPr/>
+          <p:nvPr/>
+        </p:nvSpPr>
+        <p:spPr>
+          <a:xfrm>
+            <a:off x="1238791" y="3208964"/>
+            <a:ext cx="940526" cy="809898"/>
+          </a:xfrm>
+          <a:prstGeom prst="rect">
+            <a:avLst/>
+          </a:prstGeom>
+          <a:solidFill>
+            <a:srgbClr val="FF0000"/>
+          </a:solidFill>
+        </p:spPr>
+        <p:style>
+          <a:lnRef idx="2">
+            <a:schemeClr val="accent1">
+              <a:shade val="50000"/>
+            </a:schemeClr>
+          </a:lnRef>
+          <a:fillRef idx="1">
+            <a:schemeClr val="accent1"/>
+          </a:fillRef>
+          <a:effectRef idx="0">
+            <a:schemeClr val="accent1"/>
+          </a:effectRef>
+          <a:fontRef idx="minor">
+            <a:schemeClr val="lt1"/>
+          </a:fontRef>
+        </p:style>
+        <p:txBody>
+          <a:bodyPr rtlCol="0" anchor="ctr"/>
+          <a:lstStyle/>
+          <a:p>
+            <a:pPr algn="ctr"/>
+            <a:r>
+              <a:rPr lang="en-US" dirty="0"/>
+              <a:t>Admin</a:t>
+            </a:r>
+          </a:p>
+          <a:p>
+            <a:pPr algn="ctr"/>
+            <a:r>
+              <a:rPr lang="en-US" dirty="0"/>
+              <a:t>Module</a:t>
+            </a:r>
+          </a:p>
+        </p:txBody>
+      </p:sp>
+      <p:sp>
+        <p:nvSpPr>
+          <p:cNvPr id="21" name="Rectangle 20">
+            <a:extLst>
+              <a:ext uri="{FF2B5EF4-FFF2-40B4-BE49-F238E27FC236}">
+                <a16:creationId xmlns:a16="http://schemas.microsoft.com/office/drawing/2014/main" id="{94D1CBA8-3EA1-E742-AF96-1CAFD85D40E8}"/>
+              </a:ext>
+            </a:extLst>
+          </p:cNvPr>
+          <p:cNvSpPr/>
+          <p:nvPr/>
+        </p:nvSpPr>
+        <p:spPr>
+          <a:xfrm>
+            <a:off x="2235924" y="3208964"/>
+            <a:ext cx="1012373" cy="809898"/>
+          </a:xfrm>
+          <a:prstGeom prst="rect">
+            <a:avLst/>
+          </a:prstGeom>
+          <a:solidFill>
+            <a:srgbClr val="FF0000"/>
+          </a:solidFill>
+        </p:spPr>
+        <p:style>
+          <a:lnRef idx="2">
+            <a:schemeClr val="accent1">
+              <a:shade val="50000"/>
+            </a:schemeClr>
+          </a:lnRef>
+          <a:fillRef idx="1">
+            <a:schemeClr val="accent1"/>
+          </a:fillRef>
+          <a:effectRef idx="0">
+            <a:schemeClr val="accent1"/>
+          </a:effectRef>
+          <a:fontRef idx="minor">
+            <a:schemeClr val="lt1"/>
+          </a:fontRef>
+        </p:style>
+        <p:txBody>
+          <a:bodyPr rtlCol="0" anchor="ctr"/>
+          <a:lstStyle/>
+          <a:p>
+            <a:pPr algn="ctr"/>
+            <a:r>
+              <a:rPr lang="en-US" dirty="0"/>
+              <a:t>Manager</a:t>
+            </a:r>
+          </a:p>
+          <a:p>
+            <a:pPr algn="ctr"/>
+            <a:r>
+              <a:rPr lang="en-US" dirty="0"/>
+              <a:t>Module</a:t>
+            </a:r>
+          </a:p>
+        </p:txBody>
+      </p:sp>
+      <p:sp>
+        <p:nvSpPr>
+          <p:cNvPr id="22" name="Rectangle 21">
+            <a:extLst>
+              <a:ext uri="{FF2B5EF4-FFF2-40B4-BE49-F238E27FC236}">
+                <a16:creationId xmlns:a16="http://schemas.microsoft.com/office/drawing/2014/main" id="{A790DE58-CA8C-7E4C-B0CA-433EA247EFF6}"/>
+              </a:ext>
+            </a:extLst>
+          </p:cNvPr>
+          <p:cNvSpPr/>
+          <p:nvPr/>
+        </p:nvSpPr>
+        <p:spPr>
+          <a:xfrm>
+            <a:off x="359227" y="4221479"/>
+            <a:ext cx="1221379" cy="809898"/>
+          </a:xfrm>
+          <a:prstGeom prst="rect">
+            <a:avLst/>
+          </a:prstGeom>
+          <a:solidFill>
+            <a:srgbClr val="FF0000"/>
+          </a:solidFill>
+        </p:spPr>
+        <p:style>
+          <a:lnRef idx="2">
+            <a:schemeClr val="accent1">
+              <a:shade val="50000"/>
+            </a:schemeClr>
+          </a:lnRef>
+          <a:fillRef idx="1">
+            <a:schemeClr val="accent1"/>
+          </a:fillRef>
+          <a:effectRef idx="0">
+            <a:schemeClr val="accent1"/>
+          </a:effectRef>
+          <a:fontRef idx="minor">
+            <a:schemeClr val="lt1"/>
+          </a:fontRef>
+        </p:style>
+        <p:txBody>
+          <a:bodyPr rtlCol="0" anchor="ctr"/>
+          <a:lstStyle/>
+          <a:p>
+            <a:pPr algn="ctr"/>
+            <a:r>
+              <a:rPr lang="en-US" dirty="0"/>
+              <a:t>Operator</a:t>
+            </a:r>
+          </a:p>
+          <a:p>
+            <a:pPr algn="ctr"/>
+            <a:r>
+              <a:rPr lang="en-US" dirty="0"/>
+              <a:t>Module</a:t>
+            </a:r>
+          </a:p>
+        </p:txBody>
+      </p:sp>
+      <p:sp>
+        <p:nvSpPr>
+          <p:cNvPr id="23" name="Rectangle 22">
+            <a:extLst>
+              <a:ext uri="{FF2B5EF4-FFF2-40B4-BE49-F238E27FC236}">
+                <a16:creationId xmlns:a16="http://schemas.microsoft.com/office/drawing/2014/main" id="{058C9128-67A9-8244-8BA6-CA8F4A5420A7}"/>
+              </a:ext>
+            </a:extLst>
+          </p:cNvPr>
+          <p:cNvSpPr/>
+          <p:nvPr/>
+        </p:nvSpPr>
+        <p:spPr>
+          <a:xfrm>
+            <a:off x="1730828" y="4233453"/>
+            <a:ext cx="1221379" cy="809898"/>
+          </a:xfrm>
+          <a:prstGeom prst="rect">
+            <a:avLst/>
+          </a:prstGeom>
+          <a:solidFill>
+            <a:srgbClr val="FF0000"/>
+          </a:solidFill>
+        </p:spPr>
+        <p:style>
+          <a:lnRef idx="2">
+            <a:schemeClr val="accent1">
+              <a:shade val="50000"/>
+            </a:schemeClr>
+          </a:lnRef>
+          <a:fillRef idx="1">
+            <a:schemeClr val="accent1"/>
+          </a:fillRef>
+          <a:effectRef idx="0">
+            <a:schemeClr val="accent1"/>
+          </a:effectRef>
+          <a:fontRef idx="minor">
+            <a:schemeClr val="lt1"/>
+          </a:fontRef>
+        </p:style>
+        <p:txBody>
+          <a:bodyPr rtlCol="0" anchor="ctr"/>
+          <a:lstStyle/>
+          <a:p>
+            <a:pPr algn="ctr"/>
+            <a:r>
+              <a:rPr lang="en-US" dirty="0"/>
+              <a:t>Guest</a:t>
+            </a:r>
+          </a:p>
+          <a:p>
+            <a:pPr algn="ctr"/>
+            <a:r>
+              <a:rPr lang="en-US" dirty="0"/>
+              <a:t>Module</a:t>
+            </a:r>
+          </a:p>
+        </p:txBody>
+      </p:sp>
+      <p:sp>
+        <p:nvSpPr>
+          <p:cNvPr id="24" name="Rectangle 23">
+            <a:extLst>
+              <a:ext uri="{FF2B5EF4-FFF2-40B4-BE49-F238E27FC236}">
+                <a16:creationId xmlns:a16="http://schemas.microsoft.com/office/drawing/2014/main" id="{B7CC743F-189A-4B43-9485-A77BDF8EF3DC}"/>
+              </a:ext>
+            </a:extLst>
+          </p:cNvPr>
+          <p:cNvSpPr/>
+          <p:nvPr/>
+        </p:nvSpPr>
+        <p:spPr>
+          <a:xfrm>
+            <a:off x="269962" y="3195903"/>
+            <a:ext cx="940526" cy="809898"/>
+          </a:xfrm>
+          <a:prstGeom prst="rect">
+            <a:avLst/>
+          </a:prstGeom>
+          <a:solidFill>
+            <a:srgbClr val="FF0000"/>
+          </a:solidFill>
+        </p:spPr>
+        <p:style>
+          <a:lnRef idx="2">
+            <a:schemeClr val="accent1">
+              <a:shade val="50000"/>
+            </a:schemeClr>
+          </a:lnRef>
+          <a:fillRef idx="1">
+            <a:schemeClr val="accent1"/>
+          </a:fillRef>
+          <a:effectRef idx="0">
+            <a:schemeClr val="accent1"/>
+          </a:effectRef>
+          <a:fontRef idx="minor">
+            <a:schemeClr val="lt1"/>
+          </a:fontRef>
+        </p:style>
+        <p:txBody>
+          <a:bodyPr rtlCol="0" anchor="ctr"/>
+          <a:lstStyle/>
+          <a:p>
+            <a:pPr algn="ctr"/>
+            <a:r>
+              <a:rPr lang="en-US" dirty="0"/>
+              <a:t>Auth</a:t>
+            </a:r>
+          </a:p>
+          <a:p>
+            <a:pPr algn="ctr"/>
+            <a:r>
+              <a:rPr lang="en-US" dirty="0"/>
+              <a:t>Module</a:t>
+            </a:r>
+          </a:p>
+        </p:txBody>
+      </p:sp>
+      <p:sp>
+        <p:nvSpPr>
+          <p:cNvPr id="25" name="TextBox 24">
+            <a:extLst>
+              <a:ext uri="{FF2B5EF4-FFF2-40B4-BE49-F238E27FC236}">
+                <a16:creationId xmlns:a16="http://schemas.microsoft.com/office/drawing/2014/main" id="{B3AC269B-6F62-624F-9512-FE03E4D8FFD4}"/>
+              </a:ext>
+            </a:extLst>
+          </p:cNvPr>
+          <p:cNvSpPr txBox="1"/>
+          <p:nvPr/>
+        </p:nvSpPr>
+        <p:spPr>
+          <a:xfrm>
+            <a:off x="359227" y="705394"/>
+            <a:ext cx="4755970" cy="923330"/>
+          </a:xfrm>
+          <a:prstGeom prst="rect">
+            <a:avLst/>
+          </a:prstGeom>
+          <a:noFill/>
+        </p:spPr>
+        <p:txBody>
+          <a:bodyPr wrap="square" rtlCol="0">
+            <a:spAutoFit/>
+          </a:bodyPr>
+          <a:lstStyle/>
+          <a:p>
+            <a:pPr marL="342900" indent="-342900">
+              <a:buAutoNum type="arabicPeriod"/>
+            </a:pPr>
+            <a:r>
+              <a:rPr lang="en-US" dirty="0"/>
+              <a:t>Creating Shared Modules</a:t>
+            </a:r>
+          </a:p>
+          <a:p>
+            <a:pPr marL="342900" indent="-342900">
+              <a:buAutoNum type="arabicPeriod"/>
+            </a:pPr>
+            <a:r>
+              <a:rPr lang="en-US" dirty="0"/>
+              <a:t>Lazy Loading Shared Modules</a:t>
+            </a:r>
+          </a:p>
+          <a:p>
+            <a:pPr marL="342900" indent="-342900">
+              <a:buAutoNum type="arabicPeriod"/>
+            </a:pPr>
+            <a:r>
+              <a:rPr lang="en-US" dirty="0"/>
+              <a:t>Role Base Access to the Route </a:t>
+            </a:r>
+          </a:p>
+        </p:txBody>
+      </p:sp>
+    </p:spTree>
+    <p:extLst>
+      <p:ext uri="{BB962C8B-B14F-4D97-AF65-F5344CB8AC3E}">
+        <p14:creationId xmlns:p14="http://schemas.microsoft.com/office/powerpoint/2010/main" val="1156328136"/>
+      </p:ext>
+    </p:extLst>
+  </p:cSld>
+  <p:clrMapOvr>
+    <a:masterClrMapping/>
+  </p:clrMapOvr>
+</p:sld>
+</file>
+
+<file path=ppt/slides/slide16.xml><?xml version="1.0" encoding="utf-8"?>
+<p:sld xmlns:a="http://schemas.openxmlformats.org/drawingml/2006/main" xmlns:r="http://schemas.openxmlformats.org/officeDocument/2006/relationships" xmlns:p="http://schemas.openxmlformats.org/presentationml/2006/main">
+  <p:cSld>
+    <p:spTree>
+      <p:nvGrpSpPr>
+        <p:cNvPr id="1" name=""/>
+        <p:cNvGrpSpPr/>
+        <p:nvPr/>
+      </p:nvGrpSpPr>
+      <p:grpSpPr>
+        <a:xfrm>
+          <a:off x="0" y="0"/>
+          <a:ext cx="0" cy="0"/>
+          <a:chOff x="0" y="0"/>
+          <a:chExt cx="0" cy="0"/>
+        </a:xfrm>
+      </p:grpSpPr>
+      <p:sp>
+        <p:nvSpPr>
+          <p:cNvPr id="2" name="Rectangle 1">
+            <a:extLst>
+              <a:ext uri="{FF2B5EF4-FFF2-40B4-BE49-F238E27FC236}">
+                <a16:creationId xmlns:a16="http://schemas.microsoft.com/office/drawing/2014/main" id="{3DCF4DED-437F-5449-A324-6F6F98ACA1C6}"/>
+              </a:ext>
+            </a:extLst>
+          </p:cNvPr>
+          <p:cNvSpPr/>
+          <p:nvPr/>
+        </p:nvSpPr>
+        <p:spPr>
+          <a:xfrm>
+            <a:off x="478971" y="1140823"/>
+            <a:ext cx="11530149" cy="5503817"/>
+          </a:xfrm>
+          <a:prstGeom prst="rect">
+            <a:avLst/>
+          </a:prstGeom>
+        </p:spPr>
+        <p:style>
+          <a:lnRef idx="2">
+            <a:schemeClr val="accent6"/>
+          </a:lnRef>
+          <a:fillRef idx="1">
+            <a:schemeClr val="lt1"/>
+          </a:fillRef>
+          <a:effectRef idx="0">
+            <a:schemeClr val="accent6"/>
+          </a:effectRef>
+          <a:fontRef idx="minor">
+            <a:schemeClr val="dk1"/>
+          </a:fontRef>
+        </p:style>
+        <p:txBody>
+          <a:bodyPr rtlCol="0" anchor="ctr"/>
+          <a:lstStyle/>
+          <a:p>
+            <a:pPr algn="ctr"/>
+            <a:endParaRPr lang="en-US"/>
+          </a:p>
+        </p:txBody>
+      </p:sp>
+      <p:sp>
+        <p:nvSpPr>
+          <p:cNvPr id="3" name="TextBox 2">
+            <a:extLst>
+              <a:ext uri="{FF2B5EF4-FFF2-40B4-BE49-F238E27FC236}">
+                <a16:creationId xmlns:a16="http://schemas.microsoft.com/office/drawing/2014/main" id="{162F7F34-2AD5-274B-AB00-8A7B43A6E81F}"/>
+              </a:ext>
+            </a:extLst>
+          </p:cNvPr>
+          <p:cNvSpPr txBox="1"/>
+          <p:nvPr/>
+        </p:nvSpPr>
+        <p:spPr>
+          <a:xfrm>
+            <a:off x="3317966" y="1227909"/>
+            <a:ext cx="6139543" cy="369332"/>
+          </a:xfrm>
+          <a:prstGeom prst="rect">
+            <a:avLst/>
+          </a:prstGeom>
+          <a:noFill/>
+        </p:spPr>
+        <p:txBody>
+          <a:bodyPr wrap="square" rtlCol="0">
+            <a:spAutoFit/>
+          </a:bodyPr>
+          <a:lstStyle/>
+          <a:p>
+            <a:r>
+              <a:rPr lang="en-US" dirty="0"/>
+              <a:t>Angular App with Angular Service for Http calls and Interceptor</a:t>
+            </a:r>
+          </a:p>
+        </p:txBody>
+      </p:sp>
+      <p:sp>
+        <p:nvSpPr>
+          <p:cNvPr id="4" name="Rounded Rectangle 3">
+            <a:extLst>
+              <a:ext uri="{FF2B5EF4-FFF2-40B4-BE49-F238E27FC236}">
+                <a16:creationId xmlns:a16="http://schemas.microsoft.com/office/drawing/2014/main" id="{2E3F69E1-9F5B-8C4F-A170-503814745057}"/>
+              </a:ext>
+            </a:extLst>
+          </p:cNvPr>
+          <p:cNvSpPr/>
+          <p:nvPr/>
+        </p:nvSpPr>
+        <p:spPr>
+          <a:xfrm>
+            <a:off x="566057" y="3004457"/>
+            <a:ext cx="1959429" cy="1349829"/>
+          </a:xfrm>
+          <a:prstGeom prst="roundRect">
+            <a:avLst/>
+          </a:prstGeom>
+        </p:spPr>
+        <p:style>
+          <a:lnRef idx="2">
+            <a:schemeClr val="accent1">
+              <a:shade val="50000"/>
+            </a:schemeClr>
+          </a:lnRef>
+          <a:fillRef idx="1">
+            <a:schemeClr val="accent1"/>
+          </a:fillRef>
+          <a:effectRef idx="0">
+            <a:schemeClr val="accent1"/>
+          </a:effectRef>
+          <a:fontRef idx="minor">
+            <a:schemeClr val="lt1"/>
+          </a:fontRef>
+        </p:style>
+        <p:txBody>
+          <a:bodyPr rtlCol="0" anchor="ctr"/>
+          <a:lstStyle/>
+          <a:p>
+            <a:pPr algn="ctr"/>
+            <a:r>
+              <a:rPr lang="en-US" dirty="0"/>
+              <a:t>Component</a:t>
+            </a:r>
+          </a:p>
+        </p:txBody>
+      </p:sp>
+      <p:sp>
+        <p:nvSpPr>
+          <p:cNvPr id="5" name="Rounded Rectangle 4">
+            <a:extLst>
+              <a:ext uri="{FF2B5EF4-FFF2-40B4-BE49-F238E27FC236}">
+                <a16:creationId xmlns:a16="http://schemas.microsoft.com/office/drawing/2014/main" id="{38FEEC59-874A-EF47-9587-2E406EED0337}"/>
+              </a:ext>
+            </a:extLst>
+          </p:cNvPr>
+          <p:cNvSpPr/>
+          <p:nvPr/>
+        </p:nvSpPr>
+        <p:spPr>
+          <a:xfrm>
+            <a:off x="3487782" y="3019697"/>
+            <a:ext cx="1959429" cy="1349829"/>
+          </a:xfrm>
+          <a:prstGeom prst="roundRect">
+            <a:avLst/>
+          </a:prstGeom>
+        </p:spPr>
+        <p:style>
+          <a:lnRef idx="2">
+            <a:schemeClr val="accent1">
+              <a:shade val="50000"/>
+            </a:schemeClr>
+          </a:lnRef>
+          <a:fillRef idx="1">
+            <a:schemeClr val="accent1"/>
+          </a:fillRef>
+          <a:effectRef idx="0">
+            <a:schemeClr val="accent1"/>
+          </a:effectRef>
+          <a:fontRef idx="minor">
+            <a:schemeClr val="lt1"/>
+          </a:fontRef>
+        </p:style>
+        <p:txBody>
+          <a:bodyPr rtlCol="0" anchor="ctr"/>
+          <a:lstStyle/>
+          <a:p>
+            <a:pPr algn="ctr"/>
+            <a:r>
+              <a:rPr lang="en-US" dirty="0"/>
+              <a:t>Service</a:t>
+            </a:r>
+          </a:p>
+        </p:txBody>
+      </p:sp>
+      <p:sp>
+        <p:nvSpPr>
+          <p:cNvPr id="6" name="Right Arrow 5">
+            <a:extLst>
+              <a:ext uri="{FF2B5EF4-FFF2-40B4-BE49-F238E27FC236}">
+                <a16:creationId xmlns:a16="http://schemas.microsoft.com/office/drawing/2014/main" id="{11823A4B-86DC-224B-80E6-8A26CE0CC9AC}"/>
+              </a:ext>
+            </a:extLst>
+          </p:cNvPr>
+          <p:cNvSpPr/>
+          <p:nvPr/>
+        </p:nvSpPr>
+        <p:spPr>
+          <a:xfrm>
+            <a:off x="2525486" y="3265714"/>
+            <a:ext cx="962296" cy="287383"/>
+          </a:xfrm>
+          <a:prstGeom prst="rightArrow">
+            <a:avLst/>
+          </a:prstGeom>
+          <a:solidFill>
+            <a:srgbClr val="FF0000"/>
+          </a:solidFill>
+        </p:spPr>
+        <p:style>
+          <a:lnRef idx="2">
+            <a:schemeClr val="accent1">
+              <a:shade val="50000"/>
+            </a:schemeClr>
+          </a:lnRef>
+          <a:fillRef idx="1">
+            <a:schemeClr val="accent1"/>
+          </a:fillRef>
+          <a:effectRef idx="0">
+            <a:schemeClr val="accent1"/>
+          </a:effectRef>
+          <a:fontRef idx="minor">
+            <a:schemeClr val="lt1"/>
+          </a:fontRef>
+        </p:style>
+        <p:txBody>
+          <a:bodyPr rtlCol="0" anchor="ctr"/>
+          <a:lstStyle/>
+          <a:p>
+            <a:pPr algn="ctr"/>
+            <a:endParaRPr lang="en-US"/>
+          </a:p>
+        </p:txBody>
+      </p:sp>
+      <p:sp>
+        <p:nvSpPr>
+          <p:cNvPr id="7" name="Rounded Rectangle 6">
+            <a:extLst>
+              <a:ext uri="{FF2B5EF4-FFF2-40B4-BE49-F238E27FC236}">
+                <a16:creationId xmlns:a16="http://schemas.microsoft.com/office/drawing/2014/main" id="{534E0793-89D3-584C-8EA3-FAEA43958748}"/>
+              </a:ext>
+            </a:extLst>
+          </p:cNvPr>
+          <p:cNvSpPr/>
+          <p:nvPr/>
+        </p:nvSpPr>
+        <p:spPr>
+          <a:xfrm>
+            <a:off x="6035040" y="2397034"/>
+            <a:ext cx="1959429" cy="2749731"/>
+          </a:xfrm>
+          <a:prstGeom prst="roundRect">
+            <a:avLst/>
+          </a:prstGeom>
+        </p:spPr>
+        <p:style>
+          <a:lnRef idx="2">
+            <a:schemeClr val="accent1">
+              <a:shade val="50000"/>
+            </a:schemeClr>
+          </a:lnRef>
+          <a:fillRef idx="1">
+            <a:schemeClr val="accent1"/>
+          </a:fillRef>
+          <a:effectRef idx="0">
+            <a:schemeClr val="accent1"/>
+          </a:effectRef>
+          <a:fontRef idx="minor">
+            <a:schemeClr val="lt1"/>
+          </a:fontRef>
+        </p:style>
+        <p:txBody>
+          <a:bodyPr rtlCol="0" anchor="ctr"/>
+          <a:lstStyle/>
+          <a:p>
+            <a:pPr algn="ctr"/>
+            <a:r>
+              <a:rPr lang="en-US" dirty="0" err="1"/>
+              <a:t>HttpInterceptor</a:t>
+            </a:r>
+            <a:endParaRPr lang="en-US" dirty="0"/>
+          </a:p>
+        </p:txBody>
+      </p:sp>
+      <p:sp>
+        <p:nvSpPr>
+          <p:cNvPr id="8" name="Right Arrow 7">
+            <a:extLst>
+              <a:ext uri="{FF2B5EF4-FFF2-40B4-BE49-F238E27FC236}">
+                <a16:creationId xmlns:a16="http://schemas.microsoft.com/office/drawing/2014/main" id="{AF9F4A06-9C70-FB42-87BD-1F09DB234CEE}"/>
+              </a:ext>
+            </a:extLst>
+          </p:cNvPr>
+          <p:cNvSpPr/>
+          <p:nvPr/>
+        </p:nvSpPr>
+        <p:spPr>
+          <a:xfrm>
+            <a:off x="5447211" y="3265714"/>
+            <a:ext cx="570412" cy="287383"/>
+          </a:xfrm>
+          <a:prstGeom prst="rightArrow">
+            <a:avLst/>
+          </a:prstGeom>
+          <a:solidFill>
+            <a:srgbClr val="FF0000"/>
+          </a:solidFill>
+        </p:spPr>
+        <p:style>
+          <a:lnRef idx="2">
+            <a:schemeClr val="accent1">
+              <a:shade val="50000"/>
+            </a:schemeClr>
+          </a:lnRef>
+          <a:fillRef idx="1">
+            <a:schemeClr val="accent1"/>
+          </a:fillRef>
+          <a:effectRef idx="0">
+            <a:schemeClr val="accent1"/>
+          </a:effectRef>
+          <a:fontRef idx="minor">
+            <a:schemeClr val="lt1"/>
+          </a:fontRef>
+        </p:style>
+        <p:txBody>
+          <a:bodyPr rtlCol="0" anchor="ctr"/>
+          <a:lstStyle/>
+          <a:p>
+            <a:pPr algn="ctr"/>
+            <a:endParaRPr lang="en-US"/>
+          </a:p>
+        </p:txBody>
+      </p:sp>
+      <p:sp>
+        <p:nvSpPr>
+          <p:cNvPr id="9" name="Rectangle 8">
+            <a:extLst>
+              <a:ext uri="{FF2B5EF4-FFF2-40B4-BE49-F238E27FC236}">
+                <a16:creationId xmlns:a16="http://schemas.microsoft.com/office/drawing/2014/main" id="{CFE01481-E817-0B42-AD03-4262B4712421}"/>
+              </a:ext>
+            </a:extLst>
+          </p:cNvPr>
+          <p:cNvSpPr/>
+          <p:nvPr/>
+        </p:nvSpPr>
+        <p:spPr>
+          <a:xfrm>
+            <a:off x="6244045" y="3019697"/>
+            <a:ext cx="1602378" cy="533400"/>
+          </a:xfrm>
+          <a:prstGeom prst="rect">
+            <a:avLst/>
+          </a:prstGeom>
+        </p:spPr>
+        <p:style>
+          <a:lnRef idx="2">
+            <a:schemeClr val="dk1">
+              <a:shade val="50000"/>
+            </a:schemeClr>
+          </a:lnRef>
+          <a:fillRef idx="1">
+            <a:schemeClr val="dk1"/>
+          </a:fillRef>
+          <a:effectRef idx="0">
+            <a:schemeClr val="dk1"/>
+          </a:effectRef>
+          <a:fontRef idx="minor">
+            <a:schemeClr val="lt1"/>
+          </a:fontRef>
+        </p:style>
+        <p:txBody>
+          <a:bodyPr rtlCol="0" anchor="ctr"/>
+          <a:lstStyle/>
+          <a:p>
+            <a:pPr algn="ctr"/>
+            <a:r>
+              <a:rPr lang="en-US" dirty="0"/>
+              <a:t>Request</a:t>
+            </a:r>
+          </a:p>
+          <a:p>
+            <a:pPr algn="ctr"/>
+            <a:r>
+              <a:rPr lang="en-US" dirty="0"/>
+              <a:t>Handling</a:t>
+            </a:r>
+          </a:p>
+        </p:txBody>
+      </p:sp>
+      <p:sp>
+        <p:nvSpPr>
+          <p:cNvPr id="10" name="Right Arrow 9">
+            <a:extLst>
+              <a:ext uri="{FF2B5EF4-FFF2-40B4-BE49-F238E27FC236}">
+                <a16:creationId xmlns:a16="http://schemas.microsoft.com/office/drawing/2014/main" id="{4CF45146-EB8B-9A4C-988F-036C19735BA3}"/>
+              </a:ext>
+            </a:extLst>
+          </p:cNvPr>
+          <p:cNvSpPr/>
+          <p:nvPr/>
+        </p:nvSpPr>
+        <p:spPr>
+          <a:xfrm>
+            <a:off x="7846423" y="3141617"/>
+            <a:ext cx="1602378" cy="287383"/>
+          </a:xfrm>
+          <a:prstGeom prst="rightArrow">
+            <a:avLst/>
+          </a:prstGeom>
+          <a:solidFill>
+            <a:srgbClr val="FF0000"/>
+          </a:solidFill>
+        </p:spPr>
+        <p:style>
+          <a:lnRef idx="2">
+            <a:schemeClr val="accent1">
+              <a:shade val="50000"/>
+            </a:schemeClr>
+          </a:lnRef>
+          <a:fillRef idx="1">
+            <a:schemeClr val="accent1"/>
+          </a:fillRef>
+          <a:effectRef idx="0">
+            <a:schemeClr val="accent1"/>
+          </a:effectRef>
+          <a:fontRef idx="minor">
+            <a:schemeClr val="lt1"/>
+          </a:fontRef>
+        </p:style>
+        <p:txBody>
+          <a:bodyPr rtlCol="0" anchor="ctr"/>
+          <a:lstStyle/>
+          <a:p>
+            <a:pPr algn="ctr"/>
+            <a:endParaRPr lang="en-US"/>
+          </a:p>
+        </p:txBody>
+      </p:sp>
+      <p:sp>
+        <p:nvSpPr>
+          <p:cNvPr id="11" name="TextBox 10">
+            <a:extLst>
+              <a:ext uri="{FF2B5EF4-FFF2-40B4-BE49-F238E27FC236}">
+                <a16:creationId xmlns:a16="http://schemas.microsoft.com/office/drawing/2014/main" id="{EC6C2FEA-35D9-CF48-A339-C03315597BD1}"/>
+              </a:ext>
+            </a:extLst>
+          </p:cNvPr>
+          <p:cNvSpPr txBox="1"/>
+          <p:nvPr/>
+        </p:nvSpPr>
+        <p:spPr>
+          <a:xfrm>
+            <a:off x="4781006" y="1959429"/>
+            <a:ext cx="1314993" cy="646331"/>
+          </a:xfrm>
+          <a:prstGeom prst="rect">
+            <a:avLst/>
+          </a:prstGeom>
+          <a:noFill/>
+        </p:spPr>
+        <p:txBody>
+          <a:bodyPr wrap="square" rtlCol="0">
+            <a:spAutoFit/>
+          </a:bodyPr>
+          <a:lstStyle/>
+          <a:p>
+            <a:r>
+              <a:rPr lang="en-US" dirty="0"/>
+              <a:t>Original Http request</a:t>
+            </a:r>
+          </a:p>
+        </p:txBody>
+      </p:sp>
+      <p:cxnSp>
+        <p:nvCxnSpPr>
+          <p:cNvPr id="13" name="Straight Arrow Connector 12">
+            <a:extLst>
+              <a:ext uri="{FF2B5EF4-FFF2-40B4-BE49-F238E27FC236}">
+                <a16:creationId xmlns:a16="http://schemas.microsoft.com/office/drawing/2014/main" id="{435CA9A1-B889-1544-BA47-90AFC45440D5}"/>
+              </a:ext>
+            </a:extLst>
+          </p:cNvPr>
+          <p:cNvCxnSpPr/>
+          <p:nvPr/>
+        </p:nvCxnSpPr>
+        <p:spPr>
+          <a:xfrm>
+            <a:off x="5738949" y="2569029"/>
+            <a:ext cx="0" cy="740229"/>
+          </a:xfrm>
+          <a:prstGeom prst="straightConnector1">
+            <a:avLst/>
+          </a:prstGeom>
+          <a:ln>
+            <a:tailEnd type="triangle"/>
+          </a:ln>
+        </p:spPr>
+        <p:style>
+          <a:lnRef idx="1">
+            <a:schemeClr val="accent1"/>
+          </a:lnRef>
+          <a:fillRef idx="0">
+            <a:schemeClr val="accent1"/>
+          </a:fillRef>
+          <a:effectRef idx="0">
+            <a:schemeClr val="accent1"/>
+          </a:effectRef>
+          <a:fontRef idx="minor">
+            <a:schemeClr val="tx1"/>
+          </a:fontRef>
+        </p:style>
+      </p:cxnSp>
+      <p:sp>
+        <p:nvSpPr>
+          <p:cNvPr id="14" name="TextBox 13">
+            <a:extLst>
+              <a:ext uri="{FF2B5EF4-FFF2-40B4-BE49-F238E27FC236}">
+                <a16:creationId xmlns:a16="http://schemas.microsoft.com/office/drawing/2014/main" id="{76598F11-EDC5-E84C-B61B-BAF2109C8164}"/>
+              </a:ext>
+            </a:extLst>
+          </p:cNvPr>
+          <p:cNvSpPr txBox="1"/>
+          <p:nvPr/>
+        </p:nvSpPr>
+        <p:spPr>
+          <a:xfrm>
+            <a:off x="7994469" y="2238103"/>
+            <a:ext cx="2246811" cy="923330"/>
+          </a:xfrm>
+          <a:prstGeom prst="rect">
+            <a:avLst/>
+          </a:prstGeom>
+          <a:noFill/>
+        </p:spPr>
+        <p:txBody>
+          <a:bodyPr wrap="square" rtlCol="0">
+            <a:spAutoFit/>
+          </a:bodyPr>
+          <a:lstStyle/>
+          <a:p>
+            <a:r>
+              <a:rPr lang="en-US" dirty="0"/>
+              <a:t>Modified Http Request by in receptor</a:t>
+            </a:r>
+          </a:p>
+        </p:txBody>
+      </p:sp>
+      <p:sp>
+        <p:nvSpPr>
+          <p:cNvPr id="15" name="Left Arrow 14">
+            <a:extLst>
+              <a:ext uri="{FF2B5EF4-FFF2-40B4-BE49-F238E27FC236}">
+                <a16:creationId xmlns:a16="http://schemas.microsoft.com/office/drawing/2014/main" id="{6D08FDEF-28E2-A845-9CC9-A8DA7D3B6E42}"/>
+              </a:ext>
+            </a:extLst>
+          </p:cNvPr>
+          <p:cNvSpPr/>
+          <p:nvPr/>
+        </p:nvSpPr>
+        <p:spPr>
+          <a:xfrm>
+            <a:off x="7837715" y="3984171"/>
+            <a:ext cx="1959429" cy="287383"/>
+          </a:xfrm>
+          <a:prstGeom prst="leftArrow">
+            <a:avLst/>
+          </a:prstGeom>
+          <a:solidFill>
+            <a:srgbClr val="FF0000"/>
+          </a:solidFill>
+        </p:spPr>
+        <p:style>
+          <a:lnRef idx="2">
+            <a:schemeClr val="accent1">
+              <a:shade val="50000"/>
+            </a:schemeClr>
+          </a:lnRef>
+          <a:fillRef idx="1">
+            <a:schemeClr val="accent1"/>
+          </a:fillRef>
+          <a:effectRef idx="0">
+            <a:schemeClr val="accent1"/>
+          </a:effectRef>
+          <a:fontRef idx="minor">
+            <a:schemeClr val="lt1"/>
+          </a:fontRef>
+        </p:style>
+        <p:txBody>
+          <a:bodyPr rtlCol="0" anchor="ctr"/>
+          <a:lstStyle/>
+          <a:p>
+            <a:pPr algn="ctr"/>
+            <a:endParaRPr lang="en-US"/>
+          </a:p>
+        </p:txBody>
+      </p:sp>
+      <p:sp>
+        <p:nvSpPr>
+          <p:cNvPr id="16" name="TextBox 15">
+            <a:extLst>
+              <a:ext uri="{FF2B5EF4-FFF2-40B4-BE49-F238E27FC236}">
+                <a16:creationId xmlns:a16="http://schemas.microsoft.com/office/drawing/2014/main" id="{1C2C082B-0B2C-2049-9901-A1E05C8088C7}"/>
+              </a:ext>
+            </a:extLst>
+          </p:cNvPr>
+          <p:cNvSpPr txBox="1"/>
+          <p:nvPr/>
+        </p:nvSpPr>
+        <p:spPr>
+          <a:xfrm>
+            <a:off x="8194766" y="4369526"/>
+            <a:ext cx="2046514" cy="369332"/>
+          </a:xfrm>
+          <a:prstGeom prst="rect">
+            <a:avLst/>
+          </a:prstGeom>
+          <a:noFill/>
+        </p:spPr>
+        <p:txBody>
+          <a:bodyPr wrap="square" rtlCol="0">
+            <a:spAutoFit/>
+          </a:bodyPr>
+          <a:lstStyle/>
+          <a:p>
+            <a:r>
+              <a:rPr lang="en-US" dirty="0"/>
+              <a:t>Response</a:t>
+            </a:r>
+          </a:p>
+        </p:txBody>
+      </p:sp>
+      <p:sp>
+        <p:nvSpPr>
+          <p:cNvPr id="17" name="Left Arrow 16">
+            <a:extLst>
+              <a:ext uri="{FF2B5EF4-FFF2-40B4-BE49-F238E27FC236}">
+                <a16:creationId xmlns:a16="http://schemas.microsoft.com/office/drawing/2014/main" id="{0EC1816A-4E87-6843-B159-9F5FE56D1E6D}"/>
+              </a:ext>
+            </a:extLst>
+          </p:cNvPr>
+          <p:cNvSpPr/>
+          <p:nvPr/>
+        </p:nvSpPr>
+        <p:spPr>
+          <a:xfrm>
+            <a:off x="5429792" y="3803468"/>
+            <a:ext cx="587831" cy="287383"/>
+          </a:xfrm>
+          <a:prstGeom prst="leftArrow">
+            <a:avLst/>
+          </a:prstGeom>
+          <a:solidFill>
+            <a:srgbClr val="FF0000"/>
+          </a:solidFill>
+        </p:spPr>
+        <p:style>
+          <a:lnRef idx="2">
+            <a:schemeClr val="accent1">
+              <a:shade val="50000"/>
+            </a:schemeClr>
+          </a:lnRef>
+          <a:fillRef idx="1">
+            <a:schemeClr val="accent1"/>
+          </a:fillRef>
+          <a:effectRef idx="0">
+            <a:schemeClr val="accent1"/>
+          </a:effectRef>
+          <a:fontRef idx="minor">
+            <a:schemeClr val="lt1"/>
+          </a:fontRef>
+        </p:style>
+        <p:txBody>
+          <a:bodyPr rtlCol="0" anchor="ctr"/>
+          <a:lstStyle/>
+          <a:p>
+            <a:pPr algn="ctr"/>
+            <a:endParaRPr lang="en-US"/>
+          </a:p>
+        </p:txBody>
+      </p:sp>
+      <p:cxnSp>
+        <p:nvCxnSpPr>
+          <p:cNvPr id="19" name="Straight Arrow Connector 18">
+            <a:extLst>
+              <a:ext uri="{FF2B5EF4-FFF2-40B4-BE49-F238E27FC236}">
+                <a16:creationId xmlns:a16="http://schemas.microsoft.com/office/drawing/2014/main" id="{CD1CBEFD-226D-2A43-A0C6-D4E51B5061C4}"/>
+              </a:ext>
+            </a:extLst>
+          </p:cNvPr>
+          <p:cNvCxnSpPr/>
+          <p:nvPr/>
+        </p:nvCxnSpPr>
+        <p:spPr>
+          <a:xfrm>
+            <a:off x="5738949" y="3984171"/>
+            <a:ext cx="0" cy="1162594"/>
+          </a:xfrm>
+          <a:prstGeom prst="straightConnector1">
+            <a:avLst/>
+          </a:prstGeom>
+          <a:ln>
+            <a:tailEnd type="triangle"/>
+          </a:ln>
+        </p:spPr>
+        <p:style>
+          <a:lnRef idx="1">
+            <a:schemeClr val="accent1"/>
+          </a:lnRef>
+          <a:fillRef idx="0">
+            <a:schemeClr val="accent1"/>
+          </a:fillRef>
+          <a:effectRef idx="0">
+            <a:schemeClr val="accent1"/>
+          </a:effectRef>
+          <a:fontRef idx="minor">
+            <a:schemeClr val="tx1"/>
+          </a:fontRef>
+        </p:style>
+      </p:cxnSp>
+      <p:sp>
+        <p:nvSpPr>
+          <p:cNvPr id="20" name="TextBox 19">
+            <a:extLst>
+              <a:ext uri="{FF2B5EF4-FFF2-40B4-BE49-F238E27FC236}">
+                <a16:creationId xmlns:a16="http://schemas.microsoft.com/office/drawing/2014/main" id="{9EA26534-D4A8-664E-979A-77F33E6A9BAA}"/>
+              </a:ext>
+            </a:extLst>
+          </p:cNvPr>
+          <p:cNvSpPr txBox="1"/>
+          <p:nvPr/>
+        </p:nvSpPr>
+        <p:spPr>
+          <a:xfrm>
+            <a:off x="4711337" y="5146765"/>
+            <a:ext cx="2926080" cy="369332"/>
+          </a:xfrm>
+          <a:prstGeom prst="rect">
+            <a:avLst/>
+          </a:prstGeom>
+          <a:noFill/>
+        </p:spPr>
+        <p:txBody>
+          <a:bodyPr wrap="square" rtlCol="0">
+            <a:spAutoFit/>
+          </a:bodyPr>
+          <a:lstStyle/>
+          <a:p>
+            <a:r>
+              <a:rPr lang="en-US" dirty="0"/>
+              <a:t>Response</a:t>
+            </a:r>
+          </a:p>
+        </p:txBody>
+      </p:sp>
+      <p:sp>
+        <p:nvSpPr>
+          <p:cNvPr id="21" name="Left Arrow 20">
+            <a:extLst>
+              <a:ext uri="{FF2B5EF4-FFF2-40B4-BE49-F238E27FC236}">
+                <a16:creationId xmlns:a16="http://schemas.microsoft.com/office/drawing/2014/main" id="{6E90A296-3A5D-2E44-B1A5-575B6F936059}"/>
+              </a:ext>
+            </a:extLst>
+          </p:cNvPr>
+          <p:cNvSpPr/>
+          <p:nvPr/>
+        </p:nvSpPr>
+        <p:spPr>
+          <a:xfrm>
+            <a:off x="2525484" y="3771899"/>
+            <a:ext cx="944881" cy="318952"/>
+          </a:xfrm>
+          <a:prstGeom prst="leftArrow">
+            <a:avLst/>
+          </a:prstGeom>
+          <a:solidFill>
+            <a:srgbClr val="FF0000"/>
+          </a:solidFill>
+        </p:spPr>
+        <p:style>
+          <a:lnRef idx="2">
+            <a:schemeClr val="accent1">
+              <a:shade val="50000"/>
+            </a:schemeClr>
+          </a:lnRef>
+          <a:fillRef idx="1">
+            <a:schemeClr val="accent1"/>
+          </a:fillRef>
+          <a:effectRef idx="0">
+            <a:schemeClr val="accent1"/>
+          </a:effectRef>
+          <a:fontRef idx="minor">
+            <a:schemeClr val="lt1"/>
+          </a:fontRef>
+        </p:style>
+        <p:txBody>
+          <a:bodyPr rtlCol="0" anchor="ctr"/>
+          <a:lstStyle/>
+          <a:p>
+            <a:pPr algn="ctr"/>
+            <a:endParaRPr lang="en-US"/>
+          </a:p>
+        </p:txBody>
+      </p:sp>
+    </p:spTree>
+    <p:extLst>
+      <p:ext uri="{BB962C8B-B14F-4D97-AF65-F5344CB8AC3E}">
+        <p14:creationId xmlns:p14="http://schemas.microsoft.com/office/powerpoint/2010/main" val="4271017112"/>
       </p:ext>
     </p:extLst>
   </p:cSld>

</xml_diff>